<commit_message>
Code pulling, plus notebook html
</commit_message>
<xml_diff>
--- a/Presentation/200605 presentation.pptx
+++ b/Presentation/200605 presentation.pptx
@@ -143,8 +143,8 @@
 <pc:chgInfo xmlns:a="http://schemas.openxmlformats.org/drawingml/2006/main" xmlns:r="http://schemas.openxmlformats.org/officeDocument/2006/relationships" xmlns:ac="http://schemas.microsoft.com/office/drawing/2013/main/command" xmlns:pc="http://schemas.microsoft.com/office/powerpoint/2013/main/command">
   <pc:docChgLst>
     <pc:chgData name="Ronald Buie" userId="631ae0b5ec31c07e" providerId="LiveId" clId="{7091E3B0-DB10-4FBC-B3C2-E934F51007AD}"/>
-    <pc:docChg chg="custSel modSld">
-      <pc:chgData name="Ronald Buie" userId="631ae0b5ec31c07e" providerId="LiveId" clId="{7091E3B0-DB10-4FBC-B3C2-E934F51007AD}" dt="2020-06-04T16:35:23.148" v="134" actId="14100"/>
+    <pc:docChg chg="custSel addSld delSld modSld">
+      <pc:chgData name="Ronald Buie" userId="631ae0b5ec31c07e" providerId="LiveId" clId="{7091E3B0-DB10-4FBC-B3C2-E934F51007AD}" dt="2020-06-04T22:05:58.523" v="249" actId="47"/>
       <pc:docMkLst>
         <pc:docMk/>
       </pc:docMkLst>
@@ -172,7 +172,7 @@
         </pc:spChg>
       </pc:sldChg>
       <pc:sldChg chg="delSp modSp mod">
-        <pc:chgData name="Ronald Buie" userId="631ae0b5ec31c07e" providerId="LiveId" clId="{7091E3B0-DB10-4FBC-B3C2-E934F51007AD}" dt="2020-06-04T16:31:27.964" v="19" actId="14100"/>
+        <pc:chgData name="Ronald Buie" userId="631ae0b5ec31c07e" providerId="LiveId" clId="{7091E3B0-DB10-4FBC-B3C2-E934F51007AD}" dt="2020-06-04T21:55:45.247" v="137" actId="14100"/>
         <pc:sldMkLst>
           <pc:docMk/>
           <pc:sldMk cId="0" sldId="266"/>
@@ -186,7 +186,7 @@
           </ac:spMkLst>
         </pc:spChg>
         <pc:picChg chg="mod">
-          <ac:chgData name="Ronald Buie" userId="631ae0b5ec31c07e" providerId="LiveId" clId="{7091E3B0-DB10-4FBC-B3C2-E934F51007AD}" dt="2020-06-04T16:31:27.964" v="19" actId="14100"/>
+          <ac:chgData name="Ronald Buie" userId="631ae0b5ec31c07e" providerId="LiveId" clId="{7091E3B0-DB10-4FBC-B3C2-E934F51007AD}" dt="2020-06-04T21:55:45.247" v="137" actId="14100"/>
           <ac:picMkLst>
             <pc:docMk/>
             <pc:sldMk cId="0" sldId="266"/>
@@ -263,13 +263,13 @@
         </pc:picChg>
       </pc:sldChg>
       <pc:sldChg chg="modSp mod">
-        <pc:chgData name="Ronald Buie" userId="631ae0b5ec31c07e" providerId="LiveId" clId="{7091E3B0-DB10-4FBC-B3C2-E934F51007AD}" dt="2020-06-04T16:34:55.654" v="129" actId="14100"/>
+        <pc:chgData name="Ronald Buie" userId="631ae0b5ec31c07e" providerId="LiveId" clId="{7091E3B0-DB10-4FBC-B3C2-E934F51007AD}" dt="2020-06-04T22:03:44.837" v="143" actId="14100"/>
         <pc:sldMkLst>
           <pc:docMk/>
           <pc:sldMk cId="0" sldId="271"/>
         </pc:sldMkLst>
         <pc:picChg chg="mod">
-          <ac:chgData name="Ronald Buie" userId="631ae0b5ec31c07e" providerId="LiveId" clId="{7091E3B0-DB10-4FBC-B3C2-E934F51007AD}" dt="2020-06-04T16:34:55.654" v="129" actId="14100"/>
+          <ac:chgData name="Ronald Buie" userId="631ae0b5ec31c07e" providerId="LiveId" clId="{7091E3B0-DB10-4FBC-B3C2-E934F51007AD}" dt="2020-06-04T22:03:44.837" v="143" actId="14100"/>
           <ac:picMkLst>
             <pc:docMk/>
             <pc:sldMk cId="0" sldId="271"/>
@@ -291,6 +291,28 @@
             <ac:picMk id="3" creationId="{00000000-0000-0000-0000-000000000000}"/>
           </ac:picMkLst>
         </pc:picChg>
+      </pc:sldChg>
+      <pc:sldChg chg="modSp mod">
+        <pc:chgData name="Ronald Buie" userId="631ae0b5ec31c07e" providerId="LiveId" clId="{7091E3B0-DB10-4FBC-B3C2-E934F51007AD}" dt="2020-06-04T22:05:33.166" v="247" actId="6549"/>
+        <pc:sldMkLst>
+          <pc:docMk/>
+          <pc:sldMk cId="0" sldId="273"/>
+        </pc:sldMkLst>
+        <pc:spChg chg="mod">
+          <ac:chgData name="Ronald Buie" userId="631ae0b5ec31c07e" providerId="LiveId" clId="{7091E3B0-DB10-4FBC-B3C2-E934F51007AD}" dt="2020-06-04T22:05:33.166" v="247" actId="6549"/>
+          <ac:spMkLst>
+            <pc:docMk/>
+            <pc:sldMk cId="0" sldId="273"/>
+            <ac:spMk id="3" creationId="{00000000-0000-0000-0000-000000000000}"/>
+          </ac:spMkLst>
+        </pc:spChg>
+      </pc:sldChg>
+      <pc:sldChg chg="new del">
+        <pc:chgData name="Ronald Buie" userId="631ae0b5ec31c07e" providerId="LiveId" clId="{7091E3B0-DB10-4FBC-B3C2-E934F51007AD}" dt="2020-06-04T22:05:58.523" v="249" actId="47"/>
+        <pc:sldMkLst>
+          <pc:docMk/>
+          <pc:sldMk cId="1975765640" sldId="276"/>
+        </pc:sldMkLst>
       </pc:sldChg>
     </pc:docChg>
   </pc:docChgLst>
@@ -6084,7 +6106,7 @@
         </p:nvGraphicFramePr>
         <p:xfrm>
           <a:off x="685800" y="2184400"/>
-          <a:ext cx="10820400" cy="4013200"/>
+          <a:ext cx="10820400" cy="1828800"/>
         </p:xfrm>
         <a:graphic>
           <a:graphicData uri="http://schemas.openxmlformats.org/drawingml/2006/table">
@@ -6444,8 +6466,8 @@
         </p:blipFill>
         <p:spPr bwMode="auto">
           <a:xfrm>
-            <a:off x="373447" y="1410887"/>
-            <a:ext cx="6280663" cy="5237048"/>
+            <a:off x="373447" y="208230"/>
+            <a:ext cx="6280663" cy="6439705"/>
           </a:xfrm>
           <a:prstGeom prst="rect">
             <a:avLst/>
@@ -8743,8 +8765,8 @@
         </p:blipFill>
         <p:spPr bwMode="auto">
           <a:xfrm>
-            <a:off x="93361" y="1702486"/>
-            <a:ext cx="7265087" cy="5090394"/>
+            <a:off x="74142" y="1667687"/>
+            <a:ext cx="7321378" cy="5129835"/>
           </a:xfrm>
           <a:prstGeom prst="rect">
             <a:avLst/>
@@ -8902,24 +8924,33 @@
           <a:p>
             <a:pPr lvl="1"/>
             <a:r>
-              <a:t>Our gray cluster has a higher proportion of low sentiment mean sentiments.</a:t>
-            </a:r>
+              <a:rPr dirty="0"/>
+              <a:t>Our gray cluster has a higher proportion of low </a:t>
+            </a:r>
+            <a:r>
+              <a:rPr lang="en-US" dirty="0"/>
+              <a:t>sentiment and highest sentiment, with the gold cluster being moderate</a:t>
+            </a:r>
+            <a:endParaRPr dirty="0"/>
           </a:p>
           <a:p>
             <a:pPr lvl="1"/>
             <a:r>
+              <a:rPr dirty="0"/>
               <a:t>The darker gray cluster has stronger sentiments than the lighter gray cluster</a:t>
             </a:r>
           </a:p>
           <a:p>
             <a:pPr lvl="1"/>
             <a:r>
+              <a:rPr dirty="0"/>
               <a:t>mean length seems scattered similarly across groups</a:t>
             </a:r>
           </a:p>
           <a:p>
             <a:pPr lvl="1"/>
             <a:r>
+              <a:rPr dirty="0"/>
               <a:t>2 or three clusters appears to capture</a:t>
             </a:r>
           </a:p>
@@ -9667,227 +9698,48 @@
           </a:p>
         </p:txBody>
       </p:sp>
-      <p:sp>
-        <p:nvSpPr>
-          <p:cNvPr id="3" name="Content Placeholder 2"/>
-          <p:cNvSpPr>
-            <a:spLocks noGrp="1"/>
-          </p:cNvSpPr>
-          <p:nvPr>
-            <p:ph idx="1"/>
-          </p:nvPr>
-        </p:nvSpPr>
-        <p:spPr/>
-        <p:txBody>
-          <a:bodyPr/>
-          <a:lstStyle/>
-          <a:p>
-            <a:pPr marL="0" lvl="0" indent="0">
-              <a:buNone/>
-            </a:pPr>
-            <a:r>
-              <a:t>The model is specified as:</a:t>
-            </a:r>
-          </a:p>
-          <a:p>
-            <a:pPr marL="0" lvl="0" indent="0">
-              <a:buNone/>
-            </a:pPr>
-            <a14:m xmlns:a14="http://schemas.microsoft.com/office/drawing/2010/main">
-              <m:oMathPara xmlns:m="http://schemas.openxmlformats.org/officeDocument/2006/math">
-                <m:oMathParaPr>
-                  <m:jc m:val="center"/>
-                </m:oMathParaPr>
-                <m:oMath xmlns:m="http://schemas.openxmlformats.org/officeDocument/2006/math">
-                  <m:sSub>
-                    <m:sSubPr>
-                      <m:ctrlPr>
-                        <a:rPr>
-                          <a:latin typeface="Cambria Math" panose="02040503050406030204" pitchFamily="18" charset="0"/>
-                        </a:rPr>
-                      </m:ctrlPr>
-                    </m:sSubPr>
-                    <m:e>
-                      <m:r>
-                        <a:rPr>
-                          <a:latin typeface="Cambria Math" panose="02040503050406030204" pitchFamily="18" charset="0"/>
-                        </a:rPr>
-                        <m:t>𝑑</m:t>
-                      </m:r>
-                    </m:e>
-                    <m:sub>
-                      <m:r>
-                        <a:rPr>
-                          <a:latin typeface="Cambria Math" panose="02040503050406030204" pitchFamily="18" charset="0"/>
-                        </a:rPr>
-                        <m:t>𝑖𝑗</m:t>
-                      </m:r>
-                    </m:sub>
-                  </m:sSub>
-                  <m:r>
-                    <a:rPr>
-                      <a:latin typeface="Cambria Math" panose="02040503050406030204" pitchFamily="18" charset="0"/>
-                    </a:rPr>
-                    <m:t>=</m:t>
-                  </m:r>
-                  <m:r>
-                    <a:rPr>
-                      <a:latin typeface="Cambria Math" panose="02040503050406030204" pitchFamily="18" charset="0"/>
-                    </a:rPr>
-                    <m:t>𝑑</m:t>
-                  </m:r>
-                  <m:r>
-                    <a:rPr>
-                      <a:latin typeface="Cambria Math" panose="02040503050406030204" pitchFamily="18" charset="0"/>
-                    </a:rPr>
-                    <m:t>(</m:t>
-                  </m:r>
-                  <m:r>
-                    <a:rPr>
-                      <a:latin typeface="Cambria Math" panose="02040503050406030204" pitchFamily="18" charset="0"/>
-                    </a:rPr>
-                    <m:t>𝑖</m:t>
-                  </m:r>
-                  <m:r>
-                    <a:rPr>
-                      <a:latin typeface="Cambria Math" panose="02040503050406030204" pitchFamily="18" charset="0"/>
-                    </a:rPr>
-                    <m:t>,</m:t>
-                  </m:r>
-                  <m:r>
-                    <a:rPr>
-                      <a:latin typeface="Cambria Math" panose="02040503050406030204" pitchFamily="18" charset="0"/>
-                    </a:rPr>
-                    <m:t>𝑗</m:t>
-                  </m:r>
-                  <m:r>
-                    <a:rPr>
-                      <a:latin typeface="Cambria Math" panose="02040503050406030204" pitchFamily="18" charset="0"/>
-                    </a:rPr>
-                    <m:t>)=</m:t>
-                  </m:r>
-                  <m:f>
-                    <m:fPr>
-                      <m:ctrlPr>
-                        <a:rPr i="1">
-                          <a:latin typeface="Cambria Math" panose="02040503050406030204" pitchFamily="18" charset="0"/>
-                        </a:rPr>
-                      </m:ctrlPr>
-                    </m:fPr>
-                    <m:num>
-                      <m:nary>
-                        <m:naryPr>
-                          <m:chr m:val="∑"/>
-                          <m:limLoc m:val="undOvr"/>
+      <mc:AlternateContent xmlns:mc="http://schemas.openxmlformats.org/markup-compatibility/2006" xmlns:a14="http://schemas.microsoft.com/office/drawing/2010/main">
+        <mc:Choice Requires="a14">
+          <p:sp>
+            <p:nvSpPr>
+              <p:cNvPr id="3" name="Content Placeholder 2"/>
+              <p:cNvSpPr>
+                <a:spLocks noGrp="1"/>
+              </p:cNvSpPr>
+              <p:nvPr>
+                <p:ph idx="1"/>
+              </p:nvPr>
+            </p:nvSpPr>
+            <p:spPr/>
+            <p:txBody>
+              <a:bodyPr/>
+              <a:lstStyle/>
+              <a:p>
+                <a:pPr marL="0" lvl="0" indent="0">
+                  <a:buNone/>
+                </a:pPr>
+                <a:r>
+                  <a:t>The model is specified as:</a:t>
+                </a:r>
+              </a:p>
+              <a:p>
+                <a:pPr marL="0" lvl="0" indent="0">
+                  <a:buNone/>
+                </a:pPr>
+                <a14:m>
+                  <m:oMathPara xmlns:m="http://schemas.openxmlformats.org/officeDocument/2006/math">
+                    <m:oMathParaPr>
+                      <m:jc m:val="center"/>
+                    </m:oMathParaPr>
+                    <m:oMath xmlns:m="http://schemas.openxmlformats.org/officeDocument/2006/math">
+                      <m:sSub>
+                        <m:sSubPr>
                           <m:ctrlPr>
                             <a:rPr i="1">
                               <a:latin typeface="Cambria Math" panose="02040503050406030204" pitchFamily="18" charset="0"/>
                             </a:rPr>
                           </m:ctrlPr>
-                        </m:naryPr>
-                        <m:sub>
-                          <m:r>
-                            <a:rPr>
-                              <a:latin typeface="Cambria Math" panose="02040503050406030204" pitchFamily="18" charset="0"/>
-                            </a:rPr>
-                            <m:t>𝑘</m:t>
-                          </m:r>
-                          <m:r>
-                            <a:rPr>
-                              <a:latin typeface="Cambria Math" panose="02040503050406030204" pitchFamily="18" charset="0"/>
-                            </a:rPr>
-                            <m:t>=1</m:t>
-                          </m:r>
-                        </m:sub>
-                        <m:sup>
-                          <m:r>
-                            <a:rPr>
-                              <a:latin typeface="Cambria Math" panose="02040503050406030204" pitchFamily="18" charset="0"/>
-                            </a:rPr>
-                            <m:t>𝑝</m:t>
-                          </m:r>
-                        </m:sup>
-                        <m:e>
-                          <m:sSub>
-                            <m:sSubPr>
-                              <m:ctrlPr>
-                                <a:rPr i="1">
-                                  <a:latin typeface="Cambria Math" panose="02040503050406030204" pitchFamily="18" charset="0"/>
-                                </a:rPr>
-                              </m:ctrlPr>
-                            </m:sSubPr>
-                            <m:e>
-                              <m:r>
-                                <a:rPr>
-                                  <a:latin typeface="Cambria Math" panose="02040503050406030204" pitchFamily="18" charset="0"/>
-                                </a:rPr>
-                                <m:t>𝑤</m:t>
-                              </m:r>
-                            </m:e>
-                            <m:sub>
-                              <m:r>
-                                <a:rPr>
-                                  <a:latin typeface="Cambria Math" panose="02040503050406030204" pitchFamily="18" charset="0"/>
-                                </a:rPr>
-                                <m:t>𝑘</m:t>
-                              </m:r>
-                            </m:sub>
-                          </m:sSub>
-                        </m:e>
-                      </m:nary>
-                      <m:sSubSup>
-                        <m:sSubSupPr>
-                          <m:ctrlPr>
-                            <a:rPr i="1">
-                              <a:latin typeface="Cambria Math" panose="02040503050406030204" pitchFamily="18" charset="0"/>
-                            </a:rPr>
-                          </m:ctrlPr>
-                        </m:sSubSupPr>
-                        <m:e>
-                          <m:r>
-                            <a:rPr>
-                              <a:latin typeface="Cambria Math" panose="02040503050406030204" pitchFamily="18" charset="0"/>
-                            </a:rPr>
-                            <m:t>𝛿</m:t>
-                          </m:r>
-                        </m:e>
-                        <m:sub>
-                          <m:r>
-                            <a:rPr>
-                              <a:latin typeface="Cambria Math" panose="02040503050406030204" pitchFamily="18" charset="0"/>
-                            </a:rPr>
-                            <m:t>𝑖𝑗</m:t>
-                          </m:r>
-                        </m:sub>
-                        <m:sup>
-                          <m:r>
-                            <a:rPr>
-                              <a:latin typeface="Cambria Math" panose="02040503050406030204" pitchFamily="18" charset="0"/>
-                            </a:rPr>
-                            <m:t>(</m:t>
-                          </m:r>
-                          <m:r>
-                            <a:rPr>
-                              <a:latin typeface="Cambria Math" panose="02040503050406030204" pitchFamily="18" charset="0"/>
-                            </a:rPr>
-                            <m:t>𝑘</m:t>
-                          </m:r>
-                          <m:r>
-                            <a:rPr>
-                              <a:latin typeface="Cambria Math" panose="02040503050406030204" pitchFamily="18" charset="0"/>
-                            </a:rPr>
-                            <m:t>)</m:t>
-                          </m:r>
-                        </m:sup>
-                      </m:sSubSup>
-                      <m:sSubSup>
-                        <m:sSubSupPr>
-                          <m:ctrlPr>
-                            <a:rPr i="1">
-                              <a:latin typeface="Cambria Math" panose="02040503050406030204" pitchFamily="18" charset="0"/>
-                            </a:rPr>
-                          </m:ctrlPr>
-                        </m:sSubSupPr>
+                        </m:sSubPr>
                         <m:e>
                           <m:r>
                             <a:rPr>
@@ -9904,76 +9756,132 @@
                             <m:t>𝑖𝑗</m:t>
                           </m:r>
                         </m:sub>
-                        <m:sup>
-                          <m:r>
-                            <a:rPr>
-                              <a:latin typeface="Cambria Math" panose="02040503050406030204" pitchFamily="18" charset="0"/>
-                            </a:rPr>
-                            <m:t>(</m:t>
-                          </m:r>
-                          <m:r>
-                            <a:rPr>
-                              <a:latin typeface="Cambria Math" panose="02040503050406030204" pitchFamily="18" charset="0"/>
-                            </a:rPr>
-                            <m:t>𝑘</m:t>
-                          </m:r>
-                          <m:r>
-                            <a:rPr>
-                              <a:latin typeface="Cambria Math" panose="02040503050406030204" pitchFamily="18" charset="0"/>
-                            </a:rPr>
-                            <m:t>)</m:t>
-                          </m:r>
-                        </m:sup>
-                      </m:sSubSup>
-                    </m:num>
-                    <m:den>
-                      <m:nary>
-                        <m:naryPr>
-                          <m:chr m:val="∑"/>
-                          <m:limLoc m:val="undOvr"/>
+                      </m:sSub>
+                      <m:r>
+                        <a:rPr>
+                          <a:latin typeface="Cambria Math" panose="02040503050406030204" pitchFamily="18" charset="0"/>
+                        </a:rPr>
+                        <m:t>=</m:t>
+                      </m:r>
+                      <m:r>
+                        <a:rPr>
+                          <a:latin typeface="Cambria Math" panose="02040503050406030204" pitchFamily="18" charset="0"/>
+                        </a:rPr>
+                        <m:t>𝑑</m:t>
+                      </m:r>
+                      <m:r>
+                        <a:rPr>
+                          <a:latin typeface="Cambria Math" panose="02040503050406030204" pitchFamily="18" charset="0"/>
+                        </a:rPr>
+                        <m:t>(</m:t>
+                      </m:r>
+                      <m:r>
+                        <a:rPr>
+                          <a:latin typeface="Cambria Math" panose="02040503050406030204" pitchFamily="18" charset="0"/>
+                        </a:rPr>
+                        <m:t>𝑖</m:t>
+                      </m:r>
+                      <m:r>
+                        <a:rPr>
+                          <a:latin typeface="Cambria Math" panose="02040503050406030204" pitchFamily="18" charset="0"/>
+                        </a:rPr>
+                        <m:t>,</m:t>
+                      </m:r>
+                      <m:r>
+                        <a:rPr>
+                          <a:latin typeface="Cambria Math" panose="02040503050406030204" pitchFamily="18" charset="0"/>
+                        </a:rPr>
+                        <m:t>𝑗</m:t>
+                      </m:r>
+                      <m:r>
+                        <a:rPr>
+                          <a:latin typeface="Cambria Math" panose="02040503050406030204" pitchFamily="18" charset="0"/>
+                        </a:rPr>
+                        <m:t>)=</m:t>
+                      </m:r>
+                      <m:f>
+                        <m:fPr>
                           <m:ctrlPr>
                             <a:rPr i="1">
                               <a:latin typeface="Cambria Math" panose="02040503050406030204" pitchFamily="18" charset="0"/>
                             </a:rPr>
                           </m:ctrlPr>
-                        </m:naryPr>
-                        <m:sub>
-                          <m:r>
-                            <a:rPr>
-                              <a:latin typeface="Cambria Math" panose="02040503050406030204" pitchFamily="18" charset="0"/>
-                            </a:rPr>
-                            <m:t>𝑘</m:t>
-                          </m:r>
-                          <m:r>
-                            <a:rPr>
-                              <a:latin typeface="Cambria Math" panose="02040503050406030204" pitchFamily="18" charset="0"/>
-                            </a:rPr>
-                            <m:t>=1</m:t>
-                          </m:r>
-                        </m:sub>
-                        <m:sup>
-                          <m:r>
-                            <a:rPr>
-                              <a:latin typeface="Cambria Math" panose="02040503050406030204" pitchFamily="18" charset="0"/>
-                            </a:rPr>
-                            <m:t>𝑝</m:t>
-                          </m:r>
-                        </m:sup>
-                        <m:e>
-                          <m:sSub>
-                            <m:sSubPr>
+                        </m:fPr>
+                        <m:num>
+                          <m:nary>
+                            <m:naryPr>
+                              <m:chr m:val="∑"/>
+                              <m:limLoc m:val="undOvr"/>
                               <m:ctrlPr>
                                 <a:rPr i="1">
                                   <a:latin typeface="Cambria Math" panose="02040503050406030204" pitchFamily="18" charset="0"/>
                                 </a:rPr>
                               </m:ctrlPr>
-                            </m:sSubPr>
+                            </m:naryPr>
+                            <m:sub>
+                              <m:r>
+                                <a:rPr>
+                                  <a:latin typeface="Cambria Math" panose="02040503050406030204" pitchFamily="18" charset="0"/>
+                                </a:rPr>
+                                <m:t>𝑘</m:t>
+                              </m:r>
+                              <m:r>
+                                <a:rPr>
+                                  <a:latin typeface="Cambria Math" panose="02040503050406030204" pitchFamily="18" charset="0"/>
+                                </a:rPr>
+                                <m:t>=1</m:t>
+                              </m:r>
+                            </m:sub>
+                            <m:sup>
+                              <m:r>
+                                <a:rPr>
+                                  <a:latin typeface="Cambria Math" panose="02040503050406030204" pitchFamily="18" charset="0"/>
+                                </a:rPr>
+                                <m:t>𝑝</m:t>
+                              </m:r>
+                            </m:sup>
+                            <m:e>
+                              <m:sSub>
+                                <m:sSubPr>
+                                  <m:ctrlPr>
+                                    <a:rPr i="1">
+                                      <a:latin typeface="Cambria Math" panose="02040503050406030204" pitchFamily="18" charset="0"/>
+                                    </a:rPr>
+                                  </m:ctrlPr>
+                                </m:sSubPr>
+                                <m:e>
+                                  <m:r>
+                                    <a:rPr>
+                                      <a:latin typeface="Cambria Math" panose="02040503050406030204" pitchFamily="18" charset="0"/>
+                                    </a:rPr>
+                                    <m:t>𝑤</m:t>
+                                  </m:r>
+                                </m:e>
+                                <m:sub>
+                                  <m:r>
+                                    <a:rPr>
+                                      <a:latin typeface="Cambria Math" panose="02040503050406030204" pitchFamily="18" charset="0"/>
+                                    </a:rPr>
+                                    <m:t>𝑘</m:t>
+                                  </m:r>
+                                </m:sub>
+                              </m:sSub>
+                            </m:e>
+                          </m:nary>
+                          <m:sSubSup>
+                            <m:sSubSupPr>
+                              <m:ctrlPr>
+                                <a:rPr i="1">
+                                  <a:latin typeface="Cambria Math" panose="02040503050406030204" pitchFamily="18" charset="0"/>
+                                </a:rPr>
+                              </m:ctrlPr>
+                            </m:sSubSupPr>
                             <m:e>
                               <m:r>
                                 <a:rPr>
                                   <a:latin typeface="Cambria Math" panose="02040503050406030204" pitchFamily="18" charset="0"/>
                                 </a:rPr>
-                                <m:t>𝑤</m:t>
+                                <m:t>𝛿</m:t>
                               </m:r>
                             </m:e>
                             <m:sub>
@@ -9981,221 +9889,381 @@
                                 <a:rPr>
                                   <a:latin typeface="Cambria Math" panose="02040503050406030204" pitchFamily="18" charset="0"/>
                                 </a:rPr>
+                                <m:t>𝑖𝑗</m:t>
+                              </m:r>
+                            </m:sub>
+                            <m:sup>
+                              <m:r>
+                                <a:rPr>
+                                  <a:latin typeface="Cambria Math" panose="02040503050406030204" pitchFamily="18" charset="0"/>
+                                </a:rPr>
+                                <m:t>(</m:t>
+                              </m:r>
+                              <m:r>
+                                <a:rPr>
+                                  <a:latin typeface="Cambria Math" panose="02040503050406030204" pitchFamily="18" charset="0"/>
+                                </a:rPr>
                                 <m:t>𝑘</m:t>
                               </m:r>
+                              <m:r>
+                                <a:rPr>
+                                  <a:latin typeface="Cambria Math" panose="02040503050406030204" pitchFamily="18" charset="0"/>
+                                </a:rPr>
+                                <m:t>)</m:t>
+                              </m:r>
+                            </m:sup>
+                          </m:sSubSup>
+                          <m:sSubSup>
+                            <m:sSubSupPr>
+                              <m:ctrlPr>
+                                <a:rPr i="1">
+                                  <a:latin typeface="Cambria Math" panose="02040503050406030204" pitchFamily="18" charset="0"/>
+                                </a:rPr>
+                              </m:ctrlPr>
+                            </m:sSubSupPr>
+                            <m:e>
+                              <m:r>
+                                <a:rPr>
+                                  <a:latin typeface="Cambria Math" panose="02040503050406030204" pitchFamily="18" charset="0"/>
+                                </a:rPr>
+                                <m:t>𝑑</m:t>
+                              </m:r>
+                            </m:e>
+                            <m:sub>
+                              <m:r>
+                                <a:rPr>
+                                  <a:latin typeface="Cambria Math" panose="02040503050406030204" pitchFamily="18" charset="0"/>
+                                </a:rPr>
+                                <m:t>𝑖𝑗</m:t>
+                              </m:r>
                             </m:sub>
-                          </m:sSub>
-                        </m:e>
-                      </m:nary>
-                      <m:sSubSup>
-                        <m:sSubSupPr>
-                          <m:ctrlPr>
-                            <a:rPr i="1">
-                              <a:latin typeface="Cambria Math" panose="02040503050406030204" pitchFamily="18" charset="0"/>
-                            </a:rPr>
-                          </m:ctrlPr>
-                        </m:sSubSupPr>
-                        <m:e>
-                          <m:r>
-                            <a:rPr>
-                              <a:latin typeface="Cambria Math" panose="02040503050406030204" pitchFamily="18" charset="0"/>
-                            </a:rPr>
-                            <m:t>𝛿</m:t>
-                          </m:r>
-                        </m:e>
-                        <m:sub>
-                          <m:r>
-                            <a:rPr>
-                              <a:latin typeface="Cambria Math" panose="02040503050406030204" pitchFamily="18" charset="0"/>
-                            </a:rPr>
-                            <m:t>𝑖𝑗</m:t>
-                          </m:r>
-                        </m:sub>
-                        <m:sup>
-                          <m:r>
-                            <a:rPr>
-                              <a:latin typeface="Cambria Math" panose="02040503050406030204" pitchFamily="18" charset="0"/>
-                            </a:rPr>
-                            <m:t>𝑘</m:t>
-                          </m:r>
-                        </m:sup>
-                      </m:sSubSup>
-                    </m:den>
-                  </m:f>
-                </m:oMath>
-              </m:oMathPara>
-            </a14:m>
-            <a:endParaRPr/>
-          </a:p>
-          <a:p>
-            <a:pPr marL="0" lvl="0" indent="0">
-              <a:buNone/>
-            </a:pPr>
-            <a:r>
-              <a:t>Where, for dissimilarity </a:t>
-            </a:r>
-            <a14:m xmlns:a14="http://schemas.microsoft.com/office/drawing/2010/main">
-              <m:oMath xmlns:m="http://schemas.openxmlformats.org/officeDocument/2006/math">
-                <m:r>
-                  <a:rPr>
-                    <a:latin typeface="Cambria Math" panose="02040503050406030204" pitchFamily="18" charset="0"/>
-                  </a:rPr>
-                  <m:t>𝑑</m:t>
-                </m:r>
-              </m:oMath>
-            </a14:m>
-            <a:r>
-              <a:t> for observations </a:t>
-            </a:r>
-            <a14:m xmlns:a14="http://schemas.microsoft.com/office/drawing/2010/main">
-              <m:oMath xmlns:m="http://schemas.openxmlformats.org/officeDocument/2006/math">
-                <m:r>
-                  <a:rPr>
-                    <a:latin typeface="Cambria Math" panose="02040503050406030204" pitchFamily="18" charset="0"/>
-                  </a:rPr>
-                  <m:t>𝑖</m:t>
-                </m:r>
-              </m:oMath>
-            </a14:m>
-            <a:r>
-              <a:t> &amp; </a:t>
-            </a:r>
-            <a14:m xmlns:a14="http://schemas.microsoft.com/office/drawing/2010/main">
-              <m:oMath xmlns:m="http://schemas.openxmlformats.org/officeDocument/2006/math">
-                <m:r>
-                  <a:rPr>
-                    <a:latin typeface="Cambria Math" panose="02040503050406030204" pitchFamily="18" charset="0"/>
-                  </a:rPr>
-                  <m:t>𝑗</m:t>
-                </m:r>
-              </m:oMath>
-            </a14:m>
-            <a:r>
-              <a:t>, </a:t>
-            </a:r>
-            <a14:m xmlns:a14="http://schemas.microsoft.com/office/drawing/2010/main">
-              <m:oMath xmlns:m="http://schemas.openxmlformats.org/officeDocument/2006/math">
-                <m:r>
-                  <a:rPr>
-                    <a:latin typeface="Cambria Math" panose="02040503050406030204" pitchFamily="18" charset="0"/>
-                  </a:rPr>
-                  <m:t>𝑝</m:t>
-                </m:r>
-              </m:oMath>
-            </a14:m>
-            <a:r>
-              <a:t> variables and </a:t>
-            </a:r>
-            <a14:m xmlns:a14="http://schemas.microsoft.com/office/drawing/2010/main">
-              <m:oMath xmlns:m="http://schemas.openxmlformats.org/officeDocument/2006/math">
-                <m:r>
-                  <a:rPr>
-                    <a:latin typeface="Cambria Math" panose="02040503050406030204" pitchFamily="18" charset="0"/>
-                  </a:rPr>
-                  <m:t>𝑤</m:t>
-                </m:r>
-              </m:oMath>
-            </a14:m>
-            <a:r>
-              <a:t> as an optional weighting variable, </a:t>
-            </a:r>
-            <a14:m xmlns:a14="http://schemas.microsoft.com/office/drawing/2010/main">
-              <m:oMath xmlns:m="http://schemas.openxmlformats.org/officeDocument/2006/math">
-                <m:r>
-                  <a:rPr>
-                    <a:latin typeface="Cambria Math" panose="02040503050406030204" pitchFamily="18" charset="0"/>
-                  </a:rPr>
-                  <m:t>𝛿</m:t>
-                </m:r>
-              </m:oMath>
-            </a14:m>
-            <a:r>
-              <a:t> as an indicator of missingness, where it is 0 when either variable is missing, and </a:t>
-            </a:r>
-            <a14:m xmlns:a14="http://schemas.microsoft.com/office/drawing/2010/main">
-              <m:oMath xmlns:m="http://schemas.openxmlformats.org/officeDocument/2006/math">
-                <m:r>
-                  <a:rPr>
-                    <a:latin typeface="Cambria Math" panose="02040503050406030204" pitchFamily="18" charset="0"/>
-                  </a:rPr>
-                  <m:t>𝑑</m:t>
-                </m:r>
-              </m:oMath>
-            </a14:m>
-            <a:r>
-              <a:t> is our indication of similarity.</a:t>
-            </a:r>
-          </a:p>
-          <a:p>
-            <a:pPr marL="0" lvl="0" indent="0">
-              <a:buNone/>
-            </a:pPr>
-            <a:r>
-              <a:t>Using this approach, our form of </a:t>
-            </a:r>
-            <a14:m xmlns:a14="http://schemas.microsoft.com/office/drawing/2010/main">
-              <m:oMath xmlns:m="http://schemas.openxmlformats.org/officeDocument/2006/math">
-                <m:sSubSup>
-                  <m:sSubSupPr>
-                    <m:ctrlPr>
-                      <a:rPr>
-                        <a:latin typeface="Cambria Math" panose="02040503050406030204" pitchFamily="18" charset="0"/>
-                      </a:rPr>
-                    </m:ctrlPr>
-                  </m:sSubSupPr>
-                  <m:e>
+                            <m:sup>
+                              <m:r>
+                                <a:rPr>
+                                  <a:latin typeface="Cambria Math" panose="02040503050406030204" pitchFamily="18" charset="0"/>
+                                </a:rPr>
+                                <m:t>(</m:t>
+                              </m:r>
+                              <m:r>
+                                <a:rPr>
+                                  <a:latin typeface="Cambria Math" panose="02040503050406030204" pitchFamily="18" charset="0"/>
+                                </a:rPr>
+                                <m:t>𝑘</m:t>
+                              </m:r>
+                              <m:r>
+                                <a:rPr>
+                                  <a:latin typeface="Cambria Math" panose="02040503050406030204" pitchFamily="18" charset="0"/>
+                                </a:rPr>
+                                <m:t>)</m:t>
+                              </m:r>
+                            </m:sup>
+                          </m:sSubSup>
+                        </m:num>
+                        <m:den>
+                          <m:nary>
+                            <m:naryPr>
+                              <m:chr m:val="∑"/>
+                              <m:limLoc m:val="undOvr"/>
+                              <m:ctrlPr>
+                                <a:rPr i="1">
+                                  <a:latin typeface="Cambria Math" panose="02040503050406030204" pitchFamily="18" charset="0"/>
+                                </a:rPr>
+                              </m:ctrlPr>
+                            </m:naryPr>
+                            <m:sub>
+                              <m:r>
+                                <a:rPr>
+                                  <a:latin typeface="Cambria Math" panose="02040503050406030204" pitchFamily="18" charset="0"/>
+                                </a:rPr>
+                                <m:t>𝑘</m:t>
+                              </m:r>
+                              <m:r>
+                                <a:rPr>
+                                  <a:latin typeface="Cambria Math" panose="02040503050406030204" pitchFamily="18" charset="0"/>
+                                </a:rPr>
+                                <m:t>=1</m:t>
+                              </m:r>
+                            </m:sub>
+                            <m:sup>
+                              <m:r>
+                                <a:rPr>
+                                  <a:latin typeface="Cambria Math" panose="02040503050406030204" pitchFamily="18" charset="0"/>
+                                </a:rPr>
+                                <m:t>𝑝</m:t>
+                              </m:r>
+                            </m:sup>
+                            <m:e>
+                              <m:sSub>
+                                <m:sSubPr>
+                                  <m:ctrlPr>
+                                    <a:rPr i="1">
+                                      <a:latin typeface="Cambria Math" panose="02040503050406030204" pitchFamily="18" charset="0"/>
+                                    </a:rPr>
+                                  </m:ctrlPr>
+                                </m:sSubPr>
+                                <m:e>
+                                  <m:r>
+                                    <a:rPr>
+                                      <a:latin typeface="Cambria Math" panose="02040503050406030204" pitchFamily="18" charset="0"/>
+                                    </a:rPr>
+                                    <m:t>𝑤</m:t>
+                                  </m:r>
+                                </m:e>
+                                <m:sub>
+                                  <m:r>
+                                    <a:rPr>
+                                      <a:latin typeface="Cambria Math" panose="02040503050406030204" pitchFamily="18" charset="0"/>
+                                    </a:rPr>
+                                    <m:t>𝑘</m:t>
+                                  </m:r>
+                                </m:sub>
+                              </m:sSub>
+                            </m:e>
+                          </m:nary>
+                          <m:sSubSup>
+                            <m:sSubSupPr>
+                              <m:ctrlPr>
+                                <a:rPr i="1">
+                                  <a:latin typeface="Cambria Math" panose="02040503050406030204" pitchFamily="18" charset="0"/>
+                                </a:rPr>
+                              </m:ctrlPr>
+                            </m:sSubSupPr>
+                            <m:e>
+                              <m:r>
+                                <a:rPr>
+                                  <a:latin typeface="Cambria Math" panose="02040503050406030204" pitchFamily="18" charset="0"/>
+                                </a:rPr>
+                                <m:t>𝛿</m:t>
+                              </m:r>
+                            </m:e>
+                            <m:sub>
+                              <m:r>
+                                <a:rPr>
+                                  <a:latin typeface="Cambria Math" panose="02040503050406030204" pitchFamily="18" charset="0"/>
+                                </a:rPr>
+                                <m:t>𝑖𝑗</m:t>
+                              </m:r>
+                            </m:sub>
+                            <m:sup>
+                              <m:r>
+                                <a:rPr>
+                                  <a:latin typeface="Cambria Math" panose="02040503050406030204" pitchFamily="18" charset="0"/>
+                                </a:rPr>
+                                <m:t>𝑘</m:t>
+                              </m:r>
+                            </m:sup>
+                          </m:sSubSup>
+                        </m:den>
+                      </m:f>
+                    </m:oMath>
+                  </m:oMathPara>
+                </a14:m>
+                <a:endParaRPr/>
+              </a:p>
+              <a:p>
+                <a:pPr marL="0" lvl="0" indent="0">
+                  <a:buNone/>
+                </a:pPr>
+                <a:r>
+                  <a:t>Where, for dissimilarity </a:t>
+                </a:r>
+                <a14:m>
+                  <m:oMath xmlns:m="http://schemas.openxmlformats.org/officeDocument/2006/math">
                     <m:r>
                       <a:rPr>
                         <a:latin typeface="Cambria Math" panose="02040503050406030204" pitchFamily="18" charset="0"/>
                       </a:rPr>
                       <m:t>𝑑</m:t>
                     </m:r>
-                  </m:e>
-                  <m:sub>
+                  </m:oMath>
+                </a14:m>
+                <a:r>
+                  <a:t> for observations </a:t>
+                </a:r>
+                <a14:m>
+                  <m:oMath xmlns:m="http://schemas.openxmlformats.org/officeDocument/2006/math">
                     <m:r>
                       <a:rPr>
                         <a:latin typeface="Cambria Math" panose="02040503050406030204" pitchFamily="18" charset="0"/>
                       </a:rPr>
-                      <m:t>𝑖𝑗</m:t>
+                      <m:t>𝑖</m:t>
                     </m:r>
-                  </m:sub>
-                  <m:sup>
+                  </m:oMath>
+                </a14:m>
+                <a:r>
+                  <a:t> &amp; </a:t>
+                </a:r>
+                <a14:m>
+                  <m:oMath xmlns:m="http://schemas.openxmlformats.org/officeDocument/2006/math">
                     <m:r>
                       <a:rPr>
                         <a:latin typeface="Cambria Math" panose="02040503050406030204" pitchFamily="18" charset="0"/>
                       </a:rPr>
-                      <m:t>(</m:t>
+                      <m:t>𝑗</m:t>
                     </m:r>
+                  </m:oMath>
+                </a14:m>
+                <a:r>
+                  <a:t>, </a:t>
+                </a:r>
+                <a14:m>
+                  <m:oMath xmlns:m="http://schemas.openxmlformats.org/officeDocument/2006/math">
                     <m:r>
                       <a:rPr>
                         <a:latin typeface="Cambria Math" panose="02040503050406030204" pitchFamily="18" charset="0"/>
                       </a:rPr>
-                      <m:t>𝑓</m:t>
+                      <m:t>𝑝</m:t>
                     </m:r>
+                  </m:oMath>
+                </a14:m>
+                <a:r>
+                  <a:t> variables and </a:t>
+                </a:r>
+                <a14:m>
+                  <m:oMath xmlns:m="http://schemas.openxmlformats.org/officeDocument/2006/math">
                     <m:r>
                       <a:rPr>
                         <a:latin typeface="Cambria Math" panose="02040503050406030204" pitchFamily="18" charset="0"/>
                       </a:rPr>
-                      <m:t>)</m:t>
+                      <m:t>𝑤</m:t>
                     </m:r>
-                  </m:sup>
-                </m:sSubSup>
-              </m:oMath>
-            </a14:m>
-            <a:r>
-              <a:t> varies for each variable type, but always takes a value between 0 and 1 inclusive.</a:t>
-            </a:r>
-          </a:p>
-          <a:p>
-            <a:pPr marL="0" lvl="0" indent="0">
-              <a:buNone/>
-            </a:pPr>
-            <a:r>
-              <a:t>Heirarchical clustering was then applied to the matrix to explore classification.</a:t>
-            </a:r>
-          </a:p>
-        </p:txBody>
-      </p:sp>
+                  </m:oMath>
+                </a14:m>
+                <a:r>
+                  <a:t> as an optional weighting variable, </a:t>
+                </a:r>
+                <a14:m>
+                  <m:oMath xmlns:m="http://schemas.openxmlformats.org/officeDocument/2006/math">
+                    <m:r>
+                      <a:rPr>
+                        <a:latin typeface="Cambria Math" panose="02040503050406030204" pitchFamily="18" charset="0"/>
+                      </a:rPr>
+                      <m:t>𝛿</m:t>
+                    </m:r>
+                  </m:oMath>
+                </a14:m>
+                <a:r>
+                  <a:t> as an indicator of missingness, where it is 0 when either variable is missing, and </a:t>
+                </a:r>
+                <a14:m>
+                  <m:oMath xmlns:m="http://schemas.openxmlformats.org/officeDocument/2006/math">
+                    <m:r>
+                      <a:rPr>
+                        <a:latin typeface="Cambria Math" panose="02040503050406030204" pitchFamily="18" charset="0"/>
+                      </a:rPr>
+                      <m:t>𝑑</m:t>
+                    </m:r>
+                  </m:oMath>
+                </a14:m>
+                <a:r>
+                  <a:t> is our indication of similarity.</a:t>
+                </a:r>
+              </a:p>
+              <a:p>
+                <a:pPr marL="0" lvl="0" indent="0">
+                  <a:buNone/>
+                </a:pPr>
+                <a:r>
+                  <a:t>Using this approach, our form of </a:t>
+                </a:r>
+                <a14:m>
+                  <m:oMath xmlns:m="http://schemas.openxmlformats.org/officeDocument/2006/math">
+                    <m:sSubSup>
+                      <m:sSubSupPr>
+                        <m:ctrlPr>
+                          <a:rPr i="1">
+                            <a:latin typeface="Cambria Math" panose="02040503050406030204" pitchFamily="18" charset="0"/>
+                          </a:rPr>
+                        </m:ctrlPr>
+                      </m:sSubSupPr>
+                      <m:e>
+                        <m:r>
+                          <a:rPr>
+                            <a:latin typeface="Cambria Math" panose="02040503050406030204" pitchFamily="18" charset="0"/>
+                          </a:rPr>
+                          <m:t>𝑑</m:t>
+                        </m:r>
+                      </m:e>
+                      <m:sub>
+                        <m:r>
+                          <a:rPr>
+                            <a:latin typeface="Cambria Math" panose="02040503050406030204" pitchFamily="18" charset="0"/>
+                          </a:rPr>
+                          <m:t>𝑖𝑗</m:t>
+                        </m:r>
+                      </m:sub>
+                      <m:sup>
+                        <m:r>
+                          <a:rPr>
+                            <a:latin typeface="Cambria Math" panose="02040503050406030204" pitchFamily="18" charset="0"/>
+                          </a:rPr>
+                          <m:t>(</m:t>
+                        </m:r>
+                        <m:r>
+                          <a:rPr>
+                            <a:latin typeface="Cambria Math" panose="02040503050406030204" pitchFamily="18" charset="0"/>
+                          </a:rPr>
+                          <m:t>𝑓</m:t>
+                        </m:r>
+                        <m:r>
+                          <a:rPr>
+                            <a:latin typeface="Cambria Math" panose="02040503050406030204" pitchFamily="18" charset="0"/>
+                          </a:rPr>
+                          <m:t>)</m:t>
+                        </m:r>
+                      </m:sup>
+                    </m:sSubSup>
+                  </m:oMath>
+                </a14:m>
+                <a:r>
+                  <a:t> varies for each variable type, but always takes a value between 0 and 1 inclusive.</a:t>
+                </a:r>
+              </a:p>
+              <a:p>
+                <a:pPr marL="0" lvl="0" indent="0">
+                  <a:buNone/>
+                </a:pPr>
+                <a:r>
+                  <a:t>Heirarchical clustering was then applied to the matrix to explore classification.</a:t>
+                </a:r>
+              </a:p>
+            </p:txBody>
+          </p:sp>
+        </mc:Choice>
+        <mc:Fallback xmlns="">
+          <p:sp>
+            <p:nvSpPr>
+              <p:cNvPr id="3" name="Content Placeholder 2"/>
+              <p:cNvSpPr>
+                <a:spLocks noGrp="1" noRot="1" noChangeAspect="1" noMove="1" noResize="1" noEditPoints="1" noAdjustHandles="1" noChangeArrowheads="1" noChangeShapeType="1" noTextEdit="1"/>
+              </p:cNvSpPr>
+              <p:nvPr>
+                <p:ph idx="1"/>
+              </p:nvPr>
+            </p:nvSpPr>
+            <p:spPr>
+              <a:blipFill>
+                <a:blip r:embed="rId2"/>
+                <a:stretch>
+                  <a:fillRect l="-732" t="-1970" r="-901"/>
+                </a:stretch>
+              </a:blipFill>
+            </p:spPr>
+            <p:txBody>
+              <a:bodyPr/>
+              <a:lstStyle/>
+              <a:p>
+                <a:r>
+                  <a:rPr lang="en-US">
+                    <a:noFill/>
+                  </a:rPr>
+                  <a:t> </a:t>
+                </a:r>
+              </a:p>
+            </p:txBody>
+          </p:sp>
+        </mc:Fallback>
+      </mc:AlternateContent>
     </p:spTree>
   </p:cSld>
   <p:clrMapOvr>
@@ -10257,7 +10325,7 @@
         </p:nvGraphicFramePr>
         <p:xfrm>
           <a:off x="685800" y="2184400"/>
-          <a:ext cx="10820400" cy="4013200"/>
+          <a:ext cx="10820400" cy="1828800"/>
         </p:xfrm>
         <a:graphic>
           <a:graphicData uri="http://schemas.openxmlformats.org/drawingml/2006/table">

</xml_diff>